<commit_message>
TechWatch: added links to pp and added pdf
</commit_message>
<xml_diff>
--- a/TechWatch/TechWatch.pptx
+++ b/TechWatch/TechWatch.pptx
@@ -114,6 +114,22 @@
       </a:defRPr>
     </a:lvl9pPr>
   </p:defaultTextStyle>
+  <p:extLst>
+    <p:ext uri="{EFAFB233-063F-42B5-8137-9DF3F51BA10A}">
+      <p15:sldGuideLst xmlns:p15="http://schemas.microsoft.com/office/powerpoint/2012/main">
+        <p15:guide id="1" orient="horz" pos="2160">
+          <p15:clr>
+            <a:srgbClr val="A4A3A4"/>
+          </p15:clr>
+        </p15:guide>
+        <p15:guide id="2" pos="2880">
+          <p15:clr>
+            <a:srgbClr val="A4A3A4"/>
+          </p15:clr>
+        </p15:guide>
+      </p15:sldGuideLst>
+    </p:ext>
+  </p:extLst>
 </p:presentation>
 </file>
 
@@ -199,7 +215,7 @@
           <a:p>
             <a:fld id="{D5B6A3BB-BBA0-4248-B93F-D6E520DB311E}" type="datetimeFigureOut">
               <a:rPr lang="de-DE" smtClean="0"/>
-              <a:t>22.05.2016</a:t>
+              <a:t>22.05.16</a:t>
             </a:fld>
             <a:endParaRPr lang="de-DE"/>
           </a:p>
@@ -358,7 +374,7 @@
           <a:p>
             <a:fld id="{2896EE4F-07DD-4CA7-9E8F-9349C1EA9846}" type="slidenum">
               <a:rPr lang="de-DE" smtClean="0"/>
-              <a:t>‹Nr.›</a:t>
+              <a:t>‹#›</a:t>
             </a:fld>
             <a:endParaRPr lang="de-DE"/>
           </a:p>
@@ -486,7 +502,7 @@
       </p:grpSpPr>
       <p:sp>
         <p:nvSpPr>
-          <p:cNvPr id="2" name="Folienbildplatzhalter 1"/>
+          <p:cNvPr id="2" name="Slide Image Placeholder 1"/>
           <p:cNvSpPr>
             <a:spLocks noGrp="1" noRot="1" noChangeAspect="1"/>
           </p:cNvSpPr>
@@ -498,7 +514,7 @@
       </p:sp>
       <p:sp>
         <p:nvSpPr>
-          <p:cNvPr id="3" name="Notizenplatzhalter 2"/>
+          <p:cNvPr id="3" name="Notes Placeholder 2"/>
           <p:cNvSpPr>
             <a:spLocks noGrp="1"/>
           </p:cNvSpPr>
@@ -511,38 +527,33 @@
           <a:bodyPr/>
           <a:lstStyle/>
           <a:p>
-            <a:pPr marL="0" marR="0" indent="0" algn="l" defTabSz="914400" rtl="0" eaLnBrk="1" fontAlgn="auto" latinLnBrk="0" hangingPunct="1">
-              <a:lnSpc>
-                <a:spcPct val="100000"/>
-              </a:lnSpc>
-              <a:spcBef>
-                <a:spcPts val="0"/>
-              </a:spcBef>
-              <a:spcAft>
-                <a:spcPts val="0"/>
-              </a:spcAft>
-              <a:buClrTx/>
-              <a:buSzTx/>
-              <a:buFontTx/>
-              <a:buNone/>
-              <a:tabLst/>
-              <a:defRPr/>
-            </a:pPr>
             <a:r>
               <a:rPr lang="en-US" dirty="0" smtClean="0"/>
-              <a:t>The</a:t>
-            </a:r>
-            <a:r>
-              <a:rPr lang="en-US" baseline="0" dirty="0" smtClean="0"/>
-              <a:t> question is, if this technology is something new, or if there is a technological shift in remote controlled robots: we argue yes, as especially haptics enable us to use our most useful tools to physically interact – our hands – in different, more intuitive and better ways with robots/other physical representations</a:t>
-            </a:r>
-            <a:endParaRPr lang="en-US" dirty="0" smtClean="0"/>
-          </a:p>
-        </p:txBody>
-      </p:sp>
-      <p:sp>
-        <p:nvSpPr>
-          <p:cNvPr id="4" name="Foliennummernplatzhalter 3"/>
+              <a:t> https://</a:t>
+            </a:r>
+            <a:r>
+              <a:rPr lang="en-US" dirty="0" err="1" smtClean="0"/>
+              <a:t>www.youtube.com</a:t>
+            </a:r>
+            <a:r>
+              <a:rPr lang="en-US" dirty="0" smtClean="0"/>
+              <a:t>/</a:t>
+            </a:r>
+            <a:r>
+              <a:rPr lang="en-US" dirty="0" err="1" smtClean="0"/>
+              <a:t>watch?v</a:t>
+            </a:r>
+            <a:r>
+              <a:rPr lang="en-US" dirty="0" smtClean="0"/>
+              <a:t>=p1HmgP9l4VY</a:t>
+            </a:r>
+            <a:endParaRPr lang="en-US" dirty="0"/>
+          </a:p>
+        </p:txBody>
+      </p:sp>
+      <p:sp>
+        <p:nvSpPr>
+          <p:cNvPr id="4" name="Slide Number Placeholder 3"/>
           <p:cNvSpPr>
             <a:spLocks noGrp="1"/>
           </p:cNvSpPr>
@@ -557,7 +568,7 @@
           <a:p>
             <a:fld id="{2896EE4F-07DD-4CA7-9E8F-9349C1EA9846}" type="slidenum">
               <a:rPr lang="de-DE" smtClean="0"/>
-              <a:t>4</a:t>
+              <a:t>2</a:t>
             </a:fld>
             <a:endParaRPr lang="de-DE"/>
           </a:p>
@@ -566,7 +577,7 @@
     </p:spTree>
     <p:extLst>
       <p:ext uri="{BB962C8B-B14F-4D97-AF65-F5344CB8AC3E}">
-        <p14:creationId xmlns:p14="http://schemas.microsoft.com/office/powerpoint/2010/main" val="3538182266"/>
+        <p14:creationId xmlns:p14="http://schemas.microsoft.com/office/powerpoint/2010/main" val="1440661768"/>
       </p:ext>
     </p:extLst>
   </p:cSld>
@@ -620,6 +631,115 @@
           <a:bodyPr/>
           <a:lstStyle/>
           <a:p>
+            <a:pPr marL="0" marR="0" indent="0" algn="l" defTabSz="914400" rtl="0" eaLnBrk="1" fontAlgn="auto" latinLnBrk="0" hangingPunct="1">
+              <a:lnSpc>
+                <a:spcPct val="100000"/>
+              </a:lnSpc>
+              <a:spcBef>
+                <a:spcPts val="0"/>
+              </a:spcBef>
+              <a:spcAft>
+                <a:spcPts val="0"/>
+              </a:spcAft>
+              <a:buClrTx/>
+              <a:buSzTx/>
+              <a:buFontTx/>
+              <a:buNone/>
+              <a:tabLst/>
+              <a:defRPr/>
+            </a:pPr>
+            <a:r>
+              <a:rPr lang="en-US" dirty="0" smtClean="0"/>
+              <a:t>The</a:t>
+            </a:r>
+            <a:r>
+              <a:rPr lang="en-US" baseline="0" dirty="0" smtClean="0"/>
+              <a:t> question is, if this technology is something new, or if there is a technological shift in remote controlled robots: we argue yes, as especially haptics enable us to use our most useful tools to physically interact – our hands – in different, more intuitive and better ways with robots/other physical representations</a:t>
+            </a:r>
+            <a:endParaRPr lang="en-US" dirty="0" smtClean="0"/>
+          </a:p>
+        </p:txBody>
+      </p:sp>
+      <p:sp>
+        <p:nvSpPr>
+          <p:cNvPr id="4" name="Foliennummernplatzhalter 3"/>
+          <p:cNvSpPr>
+            <a:spLocks noGrp="1"/>
+          </p:cNvSpPr>
+          <p:nvPr>
+            <p:ph type="sldNum" sz="quarter" idx="10"/>
+          </p:nvPr>
+        </p:nvSpPr>
+        <p:spPr/>
+        <p:txBody>
+          <a:bodyPr/>
+          <a:lstStyle/>
+          <a:p>
+            <a:fld id="{2896EE4F-07DD-4CA7-9E8F-9349C1EA9846}" type="slidenum">
+              <a:rPr lang="de-DE" smtClean="0"/>
+              <a:t>4</a:t>
+            </a:fld>
+            <a:endParaRPr lang="de-DE"/>
+          </a:p>
+        </p:txBody>
+      </p:sp>
+    </p:spTree>
+    <p:extLst>
+      <p:ext uri="{BB962C8B-B14F-4D97-AF65-F5344CB8AC3E}">
+        <p14:creationId xmlns:p14="http://schemas.microsoft.com/office/powerpoint/2010/main" val="3538182266"/>
+      </p:ext>
+    </p:extLst>
+  </p:cSld>
+  <p:clrMapOvr>
+    <a:masterClrMapping/>
+  </p:clrMapOvr>
+</p:notes>
+</file>
+
+<file path=ppt/notesSlides/notesSlide3.xml><?xml version="1.0" encoding="utf-8"?>
+<p:notes xmlns:a="http://schemas.openxmlformats.org/drawingml/2006/main" xmlns:r="http://schemas.openxmlformats.org/officeDocument/2006/relationships" xmlns:p="http://schemas.openxmlformats.org/presentationml/2006/main">
+  <p:cSld>
+    <p:spTree>
+      <p:nvGrpSpPr>
+        <p:cNvPr id="1" name=""/>
+        <p:cNvGrpSpPr/>
+        <p:nvPr/>
+      </p:nvGrpSpPr>
+      <p:grpSpPr>
+        <a:xfrm>
+          <a:off x="0" y="0"/>
+          <a:ext cx="0" cy="0"/>
+          <a:chOff x="0" y="0"/>
+          <a:chExt cx="0" cy="0"/>
+        </a:xfrm>
+      </p:grpSpPr>
+      <p:sp>
+        <p:nvSpPr>
+          <p:cNvPr id="2" name="Folienbildplatzhalter 1"/>
+          <p:cNvSpPr>
+            <a:spLocks noGrp="1" noRot="1" noChangeAspect="1"/>
+          </p:cNvSpPr>
+          <p:nvPr>
+            <p:ph type="sldImg"/>
+          </p:nvPr>
+        </p:nvSpPr>
+        <p:spPr/>
+      </p:sp>
+      <p:sp>
+        <p:nvSpPr>
+          <p:cNvPr id="3" name="Notizenplatzhalter 2"/>
+          <p:cNvSpPr>
+            <a:spLocks noGrp="1"/>
+          </p:cNvSpPr>
+          <p:nvPr>
+            <p:ph type="body" idx="1"/>
+          </p:nvPr>
+        </p:nvSpPr>
+        <p:spPr/>
+        <p:txBody>
+          <a:bodyPr/>
+          <a:lstStyle/>
+          <a:p>
             <a:r>
               <a:rPr lang="de-DE" dirty="0" smtClean="0"/>
               <a:t>Wie</a:t>
@@ -712,6 +832,110 @@
     <p:extLst>
       <p:ext uri="{BB962C8B-B14F-4D97-AF65-F5344CB8AC3E}">
         <p14:creationId xmlns:p14="http://schemas.microsoft.com/office/powerpoint/2010/main" val="3225187989"/>
+      </p:ext>
+    </p:extLst>
+  </p:cSld>
+  <p:clrMapOvr>
+    <a:masterClrMapping/>
+  </p:clrMapOvr>
+</p:notes>
+</file>
+
+<file path=ppt/notesSlides/notesSlide4.xml><?xml version="1.0" encoding="utf-8"?>
+<p:notes xmlns:a="http://schemas.openxmlformats.org/drawingml/2006/main" xmlns:r="http://schemas.openxmlformats.org/officeDocument/2006/relationships" xmlns:p="http://schemas.openxmlformats.org/presentationml/2006/main">
+  <p:cSld>
+    <p:spTree>
+      <p:nvGrpSpPr>
+        <p:cNvPr id="1" name=""/>
+        <p:cNvGrpSpPr/>
+        <p:nvPr/>
+      </p:nvGrpSpPr>
+      <p:grpSpPr>
+        <a:xfrm>
+          <a:off x="0" y="0"/>
+          <a:ext cx="0" cy="0"/>
+          <a:chOff x="0" y="0"/>
+          <a:chExt cx="0" cy="0"/>
+        </a:xfrm>
+      </p:grpSpPr>
+      <p:sp>
+        <p:nvSpPr>
+          <p:cNvPr id="2" name="Slide Image Placeholder 1"/>
+          <p:cNvSpPr>
+            <a:spLocks noGrp="1" noRot="1" noChangeAspect="1"/>
+          </p:cNvSpPr>
+          <p:nvPr>
+            <p:ph type="sldImg"/>
+          </p:nvPr>
+        </p:nvSpPr>
+        <p:spPr/>
+      </p:sp>
+      <p:sp>
+        <p:nvSpPr>
+          <p:cNvPr id="3" name="Notes Placeholder 2"/>
+          <p:cNvSpPr>
+            <a:spLocks noGrp="1"/>
+          </p:cNvSpPr>
+          <p:nvPr>
+            <p:ph type="body" idx="1"/>
+          </p:nvPr>
+        </p:nvSpPr>
+        <p:spPr/>
+        <p:txBody>
+          <a:bodyPr/>
+          <a:lstStyle/>
+          <a:p>
+            <a:r>
+              <a:rPr lang="en-US" dirty="0" smtClean="0"/>
+              <a:t>https://</a:t>
+            </a:r>
+            <a:r>
+              <a:rPr lang="en-US" dirty="0" err="1" smtClean="0"/>
+              <a:t>www.youtube.com</a:t>
+            </a:r>
+            <a:r>
+              <a:rPr lang="en-US" dirty="0" smtClean="0"/>
+              <a:t>/</a:t>
+            </a:r>
+            <a:r>
+              <a:rPr lang="en-US" dirty="0" err="1" smtClean="0"/>
+              <a:t>watch?v</a:t>
+            </a:r>
+            <a:r>
+              <a:rPr lang="en-US" dirty="0" smtClean="0"/>
+              <a:t>=VJ_3GJNz4fg</a:t>
+            </a:r>
+            <a:endParaRPr lang="en-US" dirty="0"/>
+          </a:p>
+        </p:txBody>
+      </p:sp>
+      <p:sp>
+        <p:nvSpPr>
+          <p:cNvPr id="4" name="Slide Number Placeholder 3"/>
+          <p:cNvSpPr>
+            <a:spLocks noGrp="1"/>
+          </p:cNvSpPr>
+          <p:nvPr>
+            <p:ph type="sldNum" sz="quarter" idx="10"/>
+          </p:nvPr>
+        </p:nvSpPr>
+        <p:spPr/>
+        <p:txBody>
+          <a:bodyPr/>
+          <a:lstStyle/>
+          <a:p>
+            <a:fld id="{2896EE4F-07DD-4CA7-9E8F-9349C1EA9846}" type="slidenum">
+              <a:rPr lang="de-DE" smtClean="0"/>
+              <a:t>8</a:t>
+            </a:fld>
+            <a:endParaRPr lang="de-DE"/>
+          </a:p>
+        </p:txBody>
+      </p:sp>
+    </p:spTree>
+    <p:extLst>
+      <p:ext uri="{BB962C8B-B14F-4D97-AF65-F5344CB8AC3E}">
+        <p14:creationId xmlns:p14="http://schemas.microsoft.com/office/powerpoint/2010/main" val="324214851"/>
       </p:ext>
     </p:extLst>
   </p:cSld>
@@ -902,7 +1126,7 @@
           <a:p>
             <a:fld id="{6AB2F235-70D5-4EF7-AFBC-63207D031D37}" type="datetimeFigureOut">
               <a:rPr lang="de-DE" smtClean="0"/>
-              <a:t>22.05.2016</a:t>
+              <a:t>22.05.16</a:t>
             </a:fld>
             <a:endParaRPr lang="de-DE"/>
           </a:p>
@@ -944,7 +1168,7 @@
           <a:p>
             <a:fld id="{4C55C626-B60E-4B20-8067-2D856B2949D0}" type="slidenum">
               <a:rPr lang="de-DE" smtClean="0"/>
-              <a:t>‹Nr.›</a:t>
+              <a:t>‹#›</a:t>
             </a:fld>
             <a:endParaRPr lang="de-DE"/>
           </a:p>
@@ -1072,7 +1296,7 @@
           <a:p>
             <a:fld id="{6AB2F235-70D5-4EF7-AFBC-63207D031D37}" type="datetimeFigureOut">
               <a:rPr lang="de-DE" smtClean="0"/>
-              <a:t>22.05.2016</a:t>
+              <a:t>22.05.16</a:t>
             </a:fld>
             <a:endParaRPr lang="de-DE"/>
           </a:p>
@@ -1114,7 +1338,7 @@
           <a:p>
             <a:fld id="{4C55C626-B60E-4B20-8067-2D856B2949D0}" type="slidenum">
               <a:rPr lang="de-DE" smtClean="0"/>
-              <a:t>‹Nr.›</a:t>
+              <a:t>‹#›</a:t>
             </a:fld>
             <a:endParaRPr lang="de-DE"/>
           </a:p>
@@ -1252,7 +1476,7 @@
           <a:p>
             <a:fld id="{6AB2F235-70D5-4EF7-AFBC-63207D031D37}" type="datetimeFigureOut">
               <a:rPr lang="de-DE" smtClean="0"/>
-              <a:t>22.05.2016</a:t>
+              <a:t>22.05.16</a:t>
             </a:fld>
             <a:endParaRPr lang="de-DE"/>
           </a:p>
@@ -1294,7 +1518,7 @@
           <a:p>
             <a:fld id="{4C55C626-B60E-4B20-8067-2D856B2949D0}" type="slidenum">
               <a:rPr lang="de-DE" smtClean="0"/>
-              <a:t>‹Nr.›</a:t>
+              <a:t>‹#›</a:t>
             </a:fld>
             <a:endParaRPr lang="de-DE"/>
           </a:p>
@@ -1422,7 +1646,7 @@
           <a:p>
             <a:fld id="{6AB2F235-70D5-4EF7-AFBC-63207D031D37}" type="datetimeFigureOut">
               <a:rPr lang="de-DE" smtClean="0"/>
-              <a:t>22.05.2016</a:t>
+              <a:t>22.05.16</a:t>
             </a:fld>
             <a:endParaRPr lang="de-DE"/>
           </a:p>
@@ -1464,7 +1688,7 @@
           <a:p>
             <a:fld id="{4C55C626-B60E-4B20-8067-2D856B2949D0}" type="slidenum">
               <a:rPr lang="de-DE" smtClean="0"/>
-              <a:t>‹Nr.›</a:t>
+              <a:t>‹#›</a:t>
             </a:fld>
             <a:endParaRPr lang="de-DE"/>
           </a:p>
@@ -1668,7 +1892,7 @@
           <a:p>
             <a:fld id="{6AB2F235-70D5-4EF7-AFBC-63207D031D37}" type="datetimeFigureOut">
               <a:rPr lang="de-DE" smtClean="0"/>
-              <a:t>22.05.2016</a:t>
+              <a:t>22.05.16</a:t>
             </a:fld>
             <a:endParaRPr lang="de-DE"/>
           </a:p>
@@ -1710,7 +1934,7 @@
           <a:p>
             <a:fld id="{4C55C626-B60E-4B20-8067-2D856B2949D0}" type="slidenum">
               <a:rPr lang="de-DE" smtClean="0"/>
-              <a:t>‹Nr.›</a:t>
+              <a:t>‹#›</a:t>
             </a:fld>
             <a:endParaRPr lang="de-DE"/>
           </a:p>
@@ -1956,7 +2180,7 @@
           <a:p>
             <a:fld id="{6AB2F235-70D5-4EF7-AFBC-63207D031D37}" type="datetimeFigureOut">
               <a:rPr lang="de-DE" smtClean="0"/>
-              <a:t>22.05.2016</a:t>
+              <a:t>22.05.16</a:t>
             </a:fld>
             <a:endParaRPr lang="de-DE"/>
           </a:p>
@@ -1998,7 +2222,7 @@
           <a:p>
             <a:fld id="{4C55C626-B60E-4B20-8067-2D856B2949D0}" type="slidenum">
               <a:rPr lang="de-DE" smtClean="0"/>
-              <a:t>‹Nr.›</a:t>
+              <a:t>‹#›</a:t>
             </a:fld>
             <a:endParaRPr lang="de-DE"/>
           </a:p>
@@ -2378,7 +2602,7 @@
           <a:p>
             <a:fld id="{6AB2F235-70D5-4EF7-AFBC-63207D031D37}" type="datetimeFigureOut">
               <a:rPr lang="de-DE" smtClean="0"/>
-              <a:t>22.05.2016</a:t>
+              <a:t>22.05.16</a:t>
             </a:fld>
             <a:endParaRPr lang="de-DE"/>
           </a:p>
@@ -2420,7 +2644,7 @@
           <a:p>
             <a:fld id="{4C55C626-B60E-4B20-8067-2D856B2949D0}" type="slidenum">
               <a:rPr lang="de-DE" smtClean="0"/>
-              <a:t>‹Nr.›</a:t>
+              <a:t>‹#›</a:t>
             </a:fld>
             <a:endParaRPr lang="de-DE"/>
           </a:p>
@@ -2496,7 +2720,7 @@
           <a:p>
             <a:fld id="{6AB2F235-70D5-4EF7-AFBC-63207D031D37}" type="datetimeFigureOut">
               <a:rPr lang="de-DE" smtClean="0"/>
-              <a:t>22.05.2016</a:t>
+              <a:t>22.05.16</a:t>
             </a:fld>
             <a:endParaRPr lang="de-DE"/>
           </a:p>
@@ -2538,7 +2762,7 @@
           <a:p>
             <a:fld id="{4C55C626-B60E-4B20-8067-2D856B2949D0}" type="slidenum">
               <a:rPr lang="de-DE" smtClean="0"/>
-              <a:t>‹Nr.›</a:t>
+              <a:t>‹#›</a:t>
             </a:fld>
             <a:endParaRPr lang="de-DE"/>
           </a:p>
@@ -2591,7 +2815,7 @@
           <a:p>
             <a:fld id="{6AB2F235-70D5-4EF7-AFBC-63207D031D37}" type="datetimeFigureOut">
               <a:rPr lang="de-DE" smtClean="0"/>
-              <a:t>22.05.2016</a:t>
+              <a:t>22.05.16</a:t>
             </a:fld>
             <a:endParaRPr lang="de-DE"/>
           </a:p>
@@ -2633,7 +2857,7 @@
           <a:p>
             <a:fld id="{4C55C626-B60E-4B20-8067-2D856B2949D0}" type="slidenum">
               <a:rPr lang="de-DE" smtClean="0"/>
-              <a:t>‹Nr.›</a:t>
+              <a:t>‹#›</a:t>
             </a:fld>
             <a:endParaRPr lang="de-DE"/>
           </a:p>
@@ -2868,7 +3092,7 @@
           <a:p>
             <a:fld id="{6AB2F235-70D5-4EF7-AFBC-63207D031D37}" type="datetimeFigureOut">
               <a:rPr lang="de-DE" smtClean="0"/>
-              <a:t>22.05.2016</a:t>
+              <a:t>22.05.16</a:t>
             </a:fld>
             <a:endParaRPr lang="de-DE"/>
           </a:p>
@@ -2910,7 +3134,7 @@
           <a:p>
             <a:fld id="{4C55C626-B60E-4B20-8067-2D856B2949D0}" type="slidenum">
               <a:rPr lang="de-DE" smtClean="0"/>
-              <a:t>‹Nr.›</a:t>
+              <a:t>‹#›</a:t>
             </a:fld>
             <a:endParaRPr lang="de-DE"/>
           </a:p>
@@ -3121,7 +3345,7 @@
           <a:p>
             <a:fld id="{6AB2F235-70D5-4EF7-AFBC-63207D031D37}" type="datetimeFigureOut">
               <a:rPr lang="de-DE" smtClean="0"/>
-              <a:t>22.05.2016</a:t>
+              <a:t>22.05.16</a:t>
             </a:fld>
             <a:endParaRPr lang="de-DE"/>
           </a:p>
@@ -3163,7 +3387,7 @@
           <a:p>
             <a:fld id="{4C55C626-B60E-4B20-8067-2D856B2949D0}" type="slidenum">
               <a:rPr lang="de-DE" smtClean="0"/>
-              <a:t>‹Nr.›</a:t>
+              <a:t>‹#›</a:t>
             </a:fld>
             <a:endParaRPr lang="de-DE"/>
           </a:p>
@@ -3334,7 +3558,7 @@
           <a:p>
             <a:fld id="{6AB2F235-70D5-4EF7-AFBC-63207D031D37}" type="datetimeFigureOut">
               <a:rPr lang="de-DE" smtClean="0"/>
-              <a:t>22.05.2016</a:t>
+              <a:t>22.05.16</a:t>
             </a:fld>
             <a:endParaRPr lang="de-DE"/>
           </a:p>
@@ -3412,7 +3636,7 @@
           <a:p>
             <a:fld id="{4C55C626-B60E-4B20-8067-2D856B2949D0}" type="slidenum">
               <a:rPr lang="de-DE" smtClean="0"/>
-              <a:t>‹Nr.›</a:t>
+              <a:t>‹#›</a:t>
             </a:fld>
             <a:endParaRPr lang="de-DE"/>
           </a:p>
@@ -4073,7 +4297,9 @@
       </p:grpSpPr>
       <p:pic>
         <p:nvPicPr>
-          <p:cNvPr id="4" name="p1HmgP9l4VY"/>
+          <p:cNvPr id="4" name="p1HmgP9l4VY">
+            <a:hlinkClick r:id="" action="ppaction://ole?verb=0"/>
+          </p:cNvPr>
           <p:cNvPicPr>
             <a:picLocks noGrp="1" noRot="1" noChangeAspect="1"/>
           </p:cNvPicPr>
@@ -4083,7 +4309,7 @@
           </p:nvPr>
         </p:nvPicPr>
         <p:blipFill>
-          <a:blip r:embed="rId3"/>
+          <a:blip r:embed="rId4"/>
           <a:stretch>
             <a:fillRect/>
           </a:stretch>
@@ -5000,11 +5226,7 @@
             </a:r>
             <a:r>
               <a:rPr lang="en-US" sz="3000" dirty="0" smtClean="0"/>
-              <a:t>     </a:t>
-            </a:r>
-            <a:r>
-              <a:rPr lang="en-US" sz="3000" dirty="0" smtClean="0"/>
-              <a:t>Touch is the earliest sense </a:t>
+              <a:t>     Touch is the earliest sense </a:t>
             </a:r>
           </a:p>
           <a:p>
@@ -5023,11 +5245,7 @@
             </a:r>
             <a:r>
               <a:rPr lang="en-US" sz="3000" dirty="0" smtClean="0"/>
-              <a:t>     </a:t>
-            </a:r>
-            <a:r>
-              <a:rPr lang="en-US" sz="3000" dirty="0" smtClean="0"/>
-              <a:t>developed in human embryology</a:t>
+              <a:t>     developed in human embryology</a:t>
             </a:r>
           </a:p>
           <a:p>
@@ -5545,11 +5763,7 @@
             </a:r>
             <a:r>
               <a:rPr lang="en-US" sz="3000" dirty="0" smtClean="0"/>
-              <a:t>     </a:t>
-            </a:r>
-            <a:r>
-              <a:rPr lang="en-US" sz="3000" dirty="0" smtClean="0"/>
-              <a:t>Touch is the earliest sense </a:t>
+              <a:t>     Touch is the earliest sense </a:t>
             </a:r>
           </a:p>
           <a:p>
@@ -5568,11 +5782,7 @@
             </a:r>
             <a:r>
               <a:rPr lang="en-US" sz="3000" dirty="0" smtClean="0"/>
-              <a:t>     </a:t>
-            </a:r>
-            <a:r>
-              <a:rPr lang="en-US" sz="3000" dirty="0" smtClean="0"/>
-              <a:t>developed in human embryology</a:t>
+              <a:t>     developed in human embryology</a:t>
             </a:r>
           </a:p>
           <a:p>
@@ -6018,14 +6228,14 @@
           </p:nvPr>
         </p:nvPicPr>
         <p:blipFill>
-          <a:blip r:embed="rId3"/>
+          <a:blip r:embed="rId4"/>
           <a:stretch>
             <a:fillRect/>
           </a:stretch>
         </p:blipFill>
         <p:spPr>
           <a:xfrm>
-            <a:off x="0" y="0"/>
+            <a:off x="-30439" y="404664"/>
             <a:ext cx="9144000" cy="6858000"/>
           </a:xfrm>
           <a:prstGeom prst="rect">

</xml_diff>

<commit_message>
TechWatch: History nach hinten verschoben
</commit_message>
<xml_diff>
--- a/TechWatch/TechWatch.pptx
+++ b/TechWatch/TechWatch.pptx
@@ -5,17 +5,18 @@
     <p:sldMasterId id="2147483648" r:id="rId1"/>
   </p:sldMasterIdLst>
   <p:notesMasterIdLst>
-    <p:notesMasterId r:id="rId10"/>
+    <p:notesMasterId r:id="rId11"/>
   </p:notesMasterIdLst>
   <p:sldIdLst>
     <p:sldId id="256" r:id="rId2"/>
     <p:sldId id="258" r:id="rId3"/>
     <p:sldId id="260" r:id="rId4"/>
-    <p:sldId id="261" r:id="rId5"/>
-    <p:sldId id="262" r:id="rId6"/>
-    <p:sldId id="263" r:id="rId7"/>
-    <p:sldId id="264" r:id="rId8"/>
-    <p:sldId id="265" r:id="rId9"/>
+    <p:sldId id="262" r:id="rId5"/>
+    <p:sldId id="263" r:id="rId6"/>
+    <p:sldId id="264" r:id="rId7"/>
+    <p:sldId id="266" r:id="rId8"/>
+    <p:sldId id="268" r:id="rId9"/>
+    <p:sldId id="267" r:id="rId10"/>
   </p:sldIdLst>
   <p:sldSz cx="9144000" cy="6858000" type="screen4x3"/>
   <p:notesSz cx="6858000" cy="9144000"/>
@@ -215,7 +216,7 @@
           <a:p>
             <a:fld id="{D5B6A3BB-BBA0-4248-B93F-D6E520DB311E}" type="datetimeFigureOut">
               <a:rPr lang="de-DE" smtClean="0"/>
-              <a:t>22.05.16</a:t>
+              <a:t>23.05.2016</a:t>
             </a:fld>
             <a:endParaRPr lang="de-DE"/>
           </a:p>
@@ -374,7 +375,7 @@
           <a:p>
             <a:fld id="{2896EE4F-07DD-4CA7-9E8F-9349C1EA9846}" type="slidenum">
               <a:rPr lang="de-DE" smtClean="0"/>
-              <a:t>‹#›</a:t>
+              <a:t>‹Nr.›</a:t>
             </a:fld>
             <a:endParaRPr lang="de-DE"/>
           </a:p>
@@ -631,32 +632,68 @@
           <a:bodyPr/>
           <a:lstStyle/>
           <a:p>
-            <a:pPr marL="0" marR="0" indent="0" algn="l" defTabSz="914400" rtl="0" eaLnBrk="1" fontAlgn="auto" latinLnBrk="0" hangingPunct="1">
-              <a:lnSpc>
-                <a:spcPct val="100000"/>
-              </a:lnSpc>
-              <a:spcBef>
-                <a:spcPts val="0"/>
-              </a:spcBef>
-              <a:spcAft>
-                <a:spcPts val="0"/>
-              </a:spcAft>
-              <a:buClrTx/>
-              <a:buSzTx/>
-              <a:buFontTx/>
-              <a:buNone/>
-              <a:tabLst/>
-              <a:defRPr/>
-            </a:pPr>
-            <a:r>
-              <a:rPr lang="en-US" dirty="0" smtClean="0"/>
-              <a:t>The</a:t>
-            </a:r>
-            <a:r>
-              <a:rPr lang="en-US" baseline="0" dirty="0" smtClean="0"/>
-              <a:t> question is, if this technology is something new, or if there is a technological shift in remote controlled robots: we argue yes, as especially haptics enable us to use our most useful tools to physically interact – our hands – in different, more intuitive and better ways with robots/other physical representations</a:t>
-            </a:r>
-            <a:endParaRPr lang="en-US" dirty="0" smtClean="0"/>
+            <a:r>
+              <a:rPr lang="de-DE" dirty="0" smtClean="0"/>
+              <a:t>Wie</a:t>
+            </a:r>
+            <a:r>
+              <a:rPr lang="de-DE" baseline="0" dirty="0" smtClean="0"/>
+              <a:t> geht sowas </a:t>
+            </a:r>
+          </a:p>
+          <a:p>
+            <a:endParaRPr lang="de-DE" baseline="0" dirty="0" smtClean="0"/>
+          </a:p>
+          <a:p>
+            <a:r>
+              <a:rPr lang="de-DE" baseline="0" dirty="0" smtClean="0"/>
+              <a:t>Wo Roboter überhaupt eingesetzt: </a:t>
+            </a:r>
+          </a:p>
+          <a:p>
+            <a:r>
+              <a:rPr lang="de-DE" baseline="0" dirty="0" smtClean="0"/>
+              <a:t>-&gt; Wo Gefahr für Menschen</a:t>
+            </a:r>
+          </a:p>
+          <a:p>
+            <a:endParaRPr lang="de-DE" baseline="0" dirty="0" smtClean="0"/>
+          </a:p>
+          <a:p>
+            <a:r>
+              <a:rPr lang="de-DE" baseline="0" dirty="0" smtClean="0"/>
+              <a:t>Oder: Dort wo PRÄZISION notwendig.</a:t>
+            </a:r>
+          </a:p>
+          <a:p>
+            <a:endParaRPr lang="de-DE" baseline="0" dirty="0" smtClean="0"/>
+          </a:p>
+          <a:p>
+            <a:r>
+              <a:rPr lang="de-DE" baseline="0" dirty="0" smtClean="0"/>
+              <a:t>&gt;&gt; Beispiel für Präzision + </a:t>
+            </a:r>
+          </a:p>
+          <a:p>
+            <a:r>
+              <a:rPr lang="de-DE" baseline="0" dirty="0" smtClean="0"/>
+              <a:t>wo es wirklich wichtig ist, dass </a:t>
+            </a:r>
+          </a:p>
+          <a:p>
+            <a:r>
+              <a:rPr lang="de-DE" baseline="0" dirty="0" smtClean="0"/>
+              <a:t>Der Steuernde das spürt, was der Roboter spürt</a:t>
+            </a:r>
+          </a:p>
+          <a:p>
+            <a:r>
+              <a:rPr lang="de-DE" baseline="0" dirty="0" smtClean="0"/>
+              <a:t>0:49</a:t>
+            </a:r>
+          </a:p>
+          <a:p>
+            <a:endParaRPr lang="de-DE" dirty="0"/>
           </a:p>
         </p:txBody>
       </p:sp>
@@ -677,7 +714,7 @@
           <a:p>
             <a:fld id="{2896EE4F-07DD-4CA7-9E8F-9349C1EA9846}" type="slidenum">
               <a:rPr lang="de-DE" smtClean="0"/>
-              <a:t>4</a:t>
+              <a:t>6</a:t>
             </a:fld>
             <a:endParaRPr lang="de-DE"/>
           </a:p>
@@ -686,7 +723,7 @@
     </p:spTree>
     <p:extLst>
       <p:ext uri="{BB962C8B-B14F-4D97-AF65-F5344CB8AC3E}">
-        <p14:creationId xmlns:p14="http://schemas.microsoft.com/office/powerpoint/2010/main" val="3538182266"/>
+        <p14:creationId xmlns:p14="http://schemas.microsoft.com/office/powerpoint/2010/main" val="3225187989"/>
       </p:ext>
     </p:extLst>
   </p:cSld>
@@ -740,64 +777,26 @@
           <a:bodyPr/>
           <a:lstStyle/>
           <a:p>
-            <a:r>
-              <a:rPr lang="de-DE" dirty="0" smtClean="0"/>
-              <a:t>Wie</a:t>
-            </a:r>
-            <a:r>
-              <a:rPr lang="de-DE" baseline="0" dirty="0" smtClean="0"/>
-              <a:t> geht sowas </a:t>
-            </a:r>
-          </a:p>
-          <a:p>
-            <a:endParaRPr lang="de-DE" baseline="0" dirty="0" smtClean="0"/>
-          </a:p>
-          <a:p>
-            <a:r>
-              <a:rPr lang="de-DE" baseline="0" dirty="0" smtClean="0"/>
-              <a:t>Wo Roboter überhaupt eingesetzt: </a:t>
-            </a:r>
-          </a:p>
-          <a:p>
-            <a:r>
-              <a:rPr lang="de-DE" baseline="0" dirty="0" smtClean="0"/>
-              <a:t>-&gt; Wo Gefahr für Menschen</a:t>
-            </a:r>
-          </a:p>
-          <a:p>
-            <a:endParaRPr lang="de-DE" baseline="0" dirty="0" smtClean="0"/>
-          </a:p>
-          <a:p>
-            <a:r>
-              <a:rPr lang="de-DE" baseline="0" dirty="0" smtClean="0"/>
-              <a:t>Oder: Dort wo PRÄZISION notwendig.</a:t>
-            </a:r>
-          </a:p>
-          <a:p>
-            <a:endParaRPr lang="de-DE" baseline="0" dirty="0" smtClean="0"/>
-          </a:p>
-          <a:p>
-            <a:r>
-              <a:rPr lang="de-DE" baseline="0" dirty="0" smtClean="0"/>
-              <a:t>&gt;&gt; Beispiel für Präzision + </a:t>
-            </a:r>
-          </a:p>
-          <a:p>
-            <a:r>
-              <a:rPr lang="de-DE" baseline="0" dirty="0" smtClean="0"/>
-              <a:t>wo es wirklich wichtig ist, dass </a:t>
-            </a:r>
-          </a:p>
-          <a:p>
-            <a:r>
-              <a:rPr lang="de-DE" baseline="0" dirty="0" smtClean="0"/>
-              <a:t>Der Steuernde das spürt, was der Roboter spürt</a:t>
-            </a:r>
-          </a:p>
-          <a:p>
-            <a:r>
-              <a:rPr lang="de-DE" baseline="0" dirty="0" smtClean="0"/>
-              <a:t>0:49</a:t>
+            <a:pPr marL="0" marR="0" indent="0" algn="l" defTabSz="914400" rtl="0" eaLnBrk="1" fontAlgn="auto" latinLnBrk="0" hangingPunct="1">
+              <a:lnSpc>
+                <a:spcPct val="100000"/>
+              </a:lnSpc>
+              <a:spcBef>
+                <a:spcPts val="0"/>
+              </a:spcBef>
+              <a:spcAft>
+                <a:spcPts val="0"/>
+              </a:spcAft>
+              <a:buClrTx/>
+              <a:buSzTx/>
+              <a:buFontTx/>
+              <a:buNone/>
+              <a:tabLst/>
+              <a:defRPr/>
+            </a:pPr>
+            <a:r>
+              <a:rPr lang="en-US" dirty="0" smtClean="0"/>
+              <a:t>https://www.youtube.com/watch?v=VJ_3GJNz4fg</a:t>
             </a:r>
           </a:p>
           <a:p>
@@ -820,7 +819,7 @@
           <a:bodyPr/>
           <a:lstStyle/>
           <a:p>
-            <a:fld id="{2896EE4F-07DD-4CA7-9E8F-9349C1EA9846}" type="slidenum">
+            <a:fld id="{B0E01E22-7D85-4A1E-8034-6D6F64E7B9C6}" type="slidenum">
               <a:rPr lang="de-DE" smtClean="0"/>
               <a:t>7</a:t>
             </a:fld>
@@ -831,7 +830,7 @@
     </p:spTree>
     <p:extLst>
       <p:ext uri="{BB962C8B-B14F-4D97-AF65-F5344CB8AC3E}">
-        <p14:creationId xmlns:p14="http://schemas.microsoft.com/office/powerpoint/2010/main" val="3225187989"/>
+        <p14:creationId xmlns:p14="http://schemas.microsoft.com/office/powerpoint/2010/main" val="782794661"/>
       </p:ext>
     </p:extLst>
   </p:cSld>
@@ -860,7 +859,7 @@
       </p:grpSpPr>
       <p:sp>
         <p:nvSpPr>
-          <p:cNvPr id="2" name="Slide Image Placeholder 1"/>
+          <p:cNvPr id="2" name="Folienbildplatzhalter 1"/>
           <p:cNvSpPr>
             <a:spLocks noGrp="1" noRot="1" noChangeAspect="1"/>
           </p:cNvSpPr>
@@ -872,7 +871,7 @@
       </p:sp>
       <p:sp>
         <p:nvSpPr>
-          <p:cNvPr id="3" name="Notes Placeholder 2"/>
+          <p:cNvPr id="3" name="Notizenplatzhalter 2"/>
           <p:cNvSpPr>
             <a:spLocks noGrp="1"/>
           </p:cNvSpPr>
@@ -885,33 +884,38 @@
           <a:bodyPr/>
           <a:lstStyle/>
           <a:p>
+            <a:pPr marL="0" marR="0" indent="0" algn="l" defTabSz="914400" rtl="0" eaLnBrk="1" fontAlgn="auto" latinLnBrk="0" hangingPunct="1">
+              <a:lnSpc>
+                <a:spcPct val="100000"/>
+              </a:lnSpc>
+              <a:spcBef>
+                <a:spcPts val="0"/>
+              </a:spcBef>
+              <a:spcAft>
+                <a:spcPts val="0"/>
+              </a:spcAft>
+              <a:buClrTx/>
+              <a:buSzTx/>
+              <a:buFontTx/>
+              <a:buNone/>
+              <a:tabLst/>
+              <a:defRPr/>
+            </a:pPr>
             <a:r>
               <a:rPr lang="en-US" dirty="0" smtClean="0"/>
-              <a:t>https://</a:t>
-            </a:r>
-            <a:r>
-              <a:rPr lang="en-US" dirty="0" err="1" smtClean="0"/>
-              <a:t>www.youtube.com</a:t>
-            </a:r>
-            <a:r>
-              <a:rPr lang="en-US" dirty="0" smtClean="0"/>
-              <a:t>/</a:t>
-            </a:r>
-            <a:r>
-              <a:rPr lang="en-US" dirty="0" err="1" smtClean="0"/>
-              <a:t>watch?v</a:t>
-            </a:r>
-            <a:r>
-              <a:rPr lang="en-US" dirty="0" smtClean="0"/>
-              <a:t>=VJ_3GJNz4fg</a:t>
-            </a:r>
-            <a:endParaRPr lang="en-US" dirty="0"/>
-          </a:p>
-        </p:txBody>
-      </p:sp>
-      <p:sp>
-        <p:nvSpPr>
-          <p:cNvPr id="4" name="Slide Number Placeholder 3"/>
+              <a:t>The</a:t>
+            </a:r>
+            <a:r>
+              <a:rPr lang="en-US" baseline="0" dirty="0" smtClean="0"/>
+              <a:t> question is, if this technology is something new, or if there is a technological shift in remote controlled robots: we argue yes, as especially haptics enable us to use our most useful tools to physically interact – our hands – in different, more intuitive and better ways with robots/other physical representations</a:t>
+            </a:r>
+            <a:endParaRPr lang="en-US" dirty="0" smtClean="0"/>
+          </a:p>
+        </p:txBody>
+      </p:sp>
+      <p:sp>
+        <p:nvSpPr>
+          <p:cNvPr id="4" name="Foliennummernplatzhalter 3"/>
           <p:cNvSpPr>
             <a:spLocks noGrp="1"/>
           </p:cNvSpPr>
@@ -935,7 +939,7 @@
     </p:spTree>
     <p:extLst>
       <p:ext uri="{BB962C8B-B14F-4D97-AF65-F5344CB8AC3E}">
-        <p14:creationId xmlns:p14="http://schemas.microsoft.com/office/powerpoint/2010/main" val="324214851"/>
+        <p14:creationId xmlns:p14="http://schemas.microsoft.com/office/powerpoint/2010/main" val="361333008"/>
       </p:ext>
     </p:extLst>
   </p:cSld>
@@ -1126,7 +1130,7 @@
           <a:p>
             <a:fld id="{6AB2F235-70D5-4EF7-AFBC-63207D031D37}" type="datetimeFigureOut">
               <a:rPr lang="de-DE" smtClean="0"/>
-              <a:t>22.05.16</a:t>
+              <a:t>23.05.2016</a:t>
             </a:fld>
             <a:endParaRPr lang="de-DE"/>
           </a:p>
@@ -1168,7 +1172,7 @@
           <a:p>
             <a:fld id="{4C55C626-B60E-4B20-8067-2D856B2949D0}" type="slidenum">
               <a:rPr lang="de-DE" smtClean="0"/>
-              <a:t>‹#›</a:t>
+              <a:t>‹Nr.›</a:t>
             </a:fld>
             <a:endParaRPr lang="de-DE"/>
           </a:p>
@@ -1296,7 +1300,7 @@
           <a:p>
             <a:fld id="{6AB2F235-70D5-4EF7-AFBC-63207D031D37}" type="datetimeFigureOut">
               <a:rPr lang="de-DE" smtClean="0"/>
-              <a:t>22.05.16</a:t>
+              <a:t>23.05.2016</a:t>
             </a:fld>
             <a:endParaRPr lang="de-DE"/>
           </a:p>
@@ -1338,7 +1342,7 @@
           <a:p>
             <a:fld id="{4C55C626-B60E-4B20-8067-2D856B2949D0}" type="slidenum">
               <a:rPr lang="de-DE" smtClean="0"/>
-              <a:t>‹#›</a:t>
+              <a:t>‹Nr.›</a:t>
             </a:fld>
             <a:endParaRPr lang="de-DE"/>
           </a:p>
@@ -1476,7 +1480,7 @@
           <a:p>
             <a:fld id="{6AB2F235-70D5-4EF7-AFBC-63207D031D37}" type="datetimeFigureOut">
               <a:rPr lang="de-DE" smtClean="0"/>
-              <a:t>22.05.16</a:t>
+              <a:t>23.05.2016</a:t>
             </a:fld>
             <a:endParaRPr lang="de-DE"/>
           </a:p>
@@ -1518,7 +1522,7 @@
           <a:p>
             <a:fld id="{4C55C626-B60E-4B20-8067-2D856B2949D0}" type="slidenum">
               <a:rPr lang="de-DE" smtClean="0"/>
-              <a:t>‹#›</a:t>
+              <a:t>‹Nr.›</a:t>
             </a:fld>
             <a:endParaRPr lang="de-DE"/>
           </a:p>
@@ -1646,7 +1650,7 @@
           <a:p>
             <a:fld id="{6AB2F235-70D5-4EF7-AFBC-63207D031D37}" type="datetimeFigureOut">
               <a:rPr lang="de-DE" smtClean="0"/>
-              <a:t>22.05.16</a:t>
+              <a:t>23.05.2016</a:t>
             </a:fld>
             <a:endParaRPr lang="de-DE"/>
           </a:p>
@@ -1688,7 +1692,7 @@
           <a:p>
             <a:fld id="{4C55C626-B60E-4B20-8067-2D856B2949D0}" type="slidenum">
               <a:rPr lang="de-DE" smtClean="0"/>
-              <a:t>‹#›</a:t>
+              <a:t>‹Nr.›</a:t>
             </a:fld>
             <a:endParaRPr lang="de-DE"/>
           </a:p>
@@ -1892,7 +1896,7 @@
           <a:p>
             <a:fld id="{6AB2F235-70D5-4EF7-AFBC-63207D031D37}" type="datetimeFigureOut">
               <a:rPr lang="de-DE" smtClean="0"/>
-              <a:t>22.05.16</a:t>
+              <a:t>23.05.2016</a:t>
             </a:fld>
             <a:endParaRPr lang="de-DE"/>
           </a:p>
@@ -1934,7 +1938,7 @@
           <a:p>
             <a:fld id="{4C55C626-B60E-4B20-8067-2D856B2949D0}" type="slidenum">
               <a:rPr lang="de-DE" smtClean="0"/>
-              <a:t>‹#›</a:t>
+              <a:t>‹Nr.›</a:t>
             </a:fld>
             <a:endParaRPr lang="de-DE"/>
           </a:p>
@@ -2180,7 +2184,7 @@
           <a:p>
             <a:fld id="{6AB2F235-70D5-4EF7-AFBC-63207D031D37}" type="datetimeFigureOut">
               <a:rPr lang="de-DE" smtClean="0"/>
-              <a:t>22.05.16</a:t>
+              <a:t>23.05.2016</a:t>
             </a:fld>
             <a:endParaRPr lang="de-DE"/>
           </a:p>
@@ -2222,7 +2226,7 @@
           <a:p>
             <a:fld id="{4C55C626-B60E-4B20-8067-2D856B2949D0}" type="slidenum">
               <a:rPr lang="de-DE" smtClean="0"/>
-              <a:t>‹#›</a:t>
+              <a:t>‹Nr.›</a:t>
             </a:fld>
             <a:endParaRPr lang="de-DE"/>
           </a:p>
@@ -2602,7 +2606,7 @@
           <a:p>
             <a:fld id="{6AB2F235-70D5-4EF7-AFBC-63207D031D37}" type="datetimeFigureOut">
               <a:rPr lang="de-DE" smtClean="0"/>
-              <a:t>22.05.16</a:t>
+              <a:t>23.05.2016</a:t>
             </a:fld>
             <a:endParaRPr lang="de-DE"/>
           </a:p>
@@ -2644,7 +2648,7 @@
           <a:p>
             <a:fld id="{4C55C626-B60E-4B20-8067-2D856B2949D0}" type="slidenum">
               <a:rPr lang="de-DE" smtClean="0"/>
-              <a:t>‹#›</a:t>
+              <a:t>‹Nr.›</a:t>
             </a:fld>
             <a:endParaRPr lang="de-DE"/>
           </a:p>
@@ -2720,7 +2724,7 @@
           <a:p>
             <a:fld id="{6AB2F235-70D5-4EF7-AFBC-63207D031D37}" type="datetimeFigureOut">
               <a:rPr lang="de-DE" smtClean="0"/>
-              <a:t>22.05.16</a:t>
+              <a:t>23.05.2016</a:t>
             </a:fld>
             <a:endParaRPr lang="de-DE"/>
           </a:p>
@@ -2762,7 +2766,7 @@
           <a:p>
             <a:fld id="{4C55C626-B60E-4B20-8067-2D856B2949D0}" type="slidenum">
               <a:rPr lang="de-DE" smtClean="0"/>
-              <a:t>‹#›</a:t>
+              <a:t>‹Nr.›</a:t>
             </a:fld>
             <a:endParaRPr lang="de-DE"/>
           </a:p>
@@ -2815,7 +2819,7 @@
           <a:p>
             <a:fld id="{6AB2F235-70D5-4EF7-AFBC-63207D031D37}" type="datetimeFigureOut">
               <a:rPr lang="de-DE" smtClean="0"/>
-              <a:t>22.05.16</a:t>
+              <a:t>23.05.2016</a:t>
             </a:fld>
             <a:endParaRPr lang="de-DE"/>
           </a:p>
@@ -2857,7 +2861,7 @@
           <a:p>
             <a:fld id="{4C55C626-B60E-4B20-8067-2D856B2949D0}" type="slidenum">
               <a:rPr lang="de-DE" smtClean="0"/>
-              <a:t>‹#›</a:t>
+              <a:t>‹Nr.›</a:t>
             </a:fld>
             <a:endParaRPr lang="de-DE"/>
           </a:p>
@@ -3092,7 +3096,7 @@
           <a:p>
             <a:fld id="{6AB2F235-70D5-4EF7-AFBC-63207D031D37}" type="datetimeFigureOut">
               <a:rPr lang="de-DE" smtClean="0"/>
-              <a:t>22.05.16</a:t>
+              <a:t>23.05.2016</a:t>
             </a:fld>
             <a:endParaRPr lang="de-DE"/>
           </a:p>
@@ -3134,7 +3138,7 @@
           <a:p>
             <a:fld id="{4C55C626-B60E-4B20-8067-2D856B2949D0}" type="slidenum">
               <a:rPr lang="de-DE" smtClean="0"/>
-              <a:t>‹#›</a:t>
+              <a:t>‹Nr.›</a:t>
             </a:fld>
             <a:endParaRPr lang="de-DE"/>
           </a:p>
@@ -3345,7 +3349,7 @@
           <a:p>
             <a:fld id="{6AB2F235-70D5-4EF7-AFBC-63207D031D37}" type="datetimeFigureOut">
               <a:rPr lang="de-DE" smtClean="0"/>
-              <a:t>22.05.16</a:t>
+              <a:t>23.05.2016</a:t>
             </a:fld>
             <a:endParaRPr lang="de-DE"/>
           </a:p>
@@ -3387,7 +3391,7 @@
           <a:p>
             <a:fld id="{4C55C626-B60E-4B20-8067-2D856B2949D0}" type="slidenum">
               <a:rPr lang="de-DE" smtClean="0"/>
-              <a:t>‹#›</a:t>
+              <a:t>‹Nr.›</a:t>
             </a:fld>
             <a:endParaRPr lang="de-DE"/>
           </a:p>
@@ -3558,7 +3562,7 @@
           <a:p>
             <a:fld id="{6AB2F235-70D5-4EF7-AFBC-63207D031D37}" type="datetimeFigureOut">
               <a:rPr lang="de-DE" smtClean="0"/>
-              <a:t>22.05.16</a:t>
+              <a:t>23.05.2016</a:t>
             </a:fld>
             <a:endParaRPr lang="de-DE"/>
           </a:p>
@@ -3636,7 +3640,7 @@
           <a:p>
             <a:fld id="{4C55C626-B60E-4B20-8067-2D856B2949D0}" type="slidenum">
               <a:rPr lang="de-DE" smtClean="0"/>
-              <a:t>‹#›</a:t>
+              <a:t>‹Nr.›</a:t>
             </a:fld>
             <a:endParaRPr lang="de-DE"/>
           </a:p>
@@ -4891,288 +4895,6 @@
           <a:p>
             <a:pPr algn="l"/>
             <a:r>
-              <a:rPr lang="de-DE" b="1" dirty="0" err="1" smtClean="0"/>
-              <a:t>History</a:t>
-            </a:r>
-            <a:endParaRPr lang="de-DE" b="1" dirty="0"/>
-          </a:p>
-        </p:txBody>
-      </p:sp>
-      <p:pic>
-        <p:nvPicPr>
-          <p:cNvPr id="4" name="Bild 3"/>
-          <p:cNvPicPr>
-            <a:picLocks noChangeAspect="1"/>
-          </p:cNvPicPr>
-          <p:nvPr/>
-        </p:nvPicPr>
-        <p:blipFill>
-          <a:blip r:embed="rId3">
-            <a:extLst>
-              <a:ext uri="{28A0092B-C50C-407E-A947-70E740481C1C}">
-                <a14:useLocalDpi xmlns:a14="http://schemas.microsoft.com/office/drawing/2010/main" val="0"/>
-              </a:ext>
-            </a:extLst>
-          </a:blip>
-          <a:stretch>
-            <a:fillRect/>
-          </a:stretch>
-        </p:blipFill>
-        <p:spPr>
-          <a:xfrm>
-            <a:off x="384168" y="1412776"/>
-            <a:ext cx="1778876" cy="1778876"/>
-          </a:xfrm>
-          <a:prstGeom prst="rect">
-            <a:avLst/>
-          </a:prstGeom>
-        </p:spPr>
-      </p:pic>
-      <p:pic>
-        <p:nvPicPr>
-          <p:cNvPr id="5" name="Bild 4"/>
-          <p:cNvPicPr>
-            <a:picLocks noChangeAspect="1"/>
-          </p:cNvPicPr>
-          <p:nvPr/>
-        </p:nvPicPr>
-        <p:blipFill>
-          <a:blip r:embed="rId4" cstate="print">
-            <a:extLst>
-              <a:ext uri="{28A0092B-C50C-407E-A947-70E740481C1C}">
-                <a14:useLocalDpi xmlns:a14="http://schemas.microsoft.com/office/drawing/2010/main" val="0"/>
-              </a:ext>
-            </a:extLst>
-          </a:blip>
-          <a:stretch>
-            <a:fillRect/>
-          </a:stretch>
-        </p:blipFill>
-        <p:spPr>
-          <a:xfrm>
-            <a:off x="2163044" y="1412776"/>
-            <a:ext cx="3345060" cy="1778876"/>
-          </a:xfrm>
-          <a:prstGeom prst="rect">
-            <a:avLst/>
-          </a:prstGeom>
-        </p:spPr>
-      </p:pic>
-      <p:pic>
-        <p:nvPicPr>
-          <p:cNvPr id="6" name="Bild 5"/>
-          <p:cNvPicPr>
-            <a:picLocks noChangeAspect="1"/>
-          </p:cNvPicPr>
-          <p:nvPr/>
-        </p:nvPicPr>
-        <p:blipFill>
-          <a:blip r:embed="rId5" cstate="print">
-            <a:extLst>
-              <a:ext uri="{28A0092B-C50C-407E-A947-70E740481C1C}">
-                <a14:useLocalDpi xmlns:a14="http://schemas.microsoft.com/office/drawing/2010/main" val="0"/>
-              </a:ext>
-            </a:extLst>
-          </a:blip>
-          <a:stretch>
-            <a:fillRect/>
-          </a:stretch>
-        </p:blipFill>
-        <p:spPr>
-          <a:xfrm>
-            <a:off x="191040" y="3425506"/>
-            <a:ext cx="2165131" cy="2165131"/>
-          </a:xfrm>
-          <a:prstGeom prst="rect">
-            <a:avLst/>
-          </a:prstGeom>
-        </p:spPr>
-      </p:pic>
-      <p:pic>
-        <p:nvPicPr>
-          <p:cNvPr id="7" name="Bild 6"/>
-          <p:cNvPicPr>
-            <a:picLocks noChangeAspect="1"/>
-          </p:cNvPicPr>
-          <p:nvPr/>
-        </p:nvPicPr>
-        <p:blipFill>
-          <a:blip r:embed="rId6">
-            <a:extLst>
-              <a:ext uri="{28A0092B-C50C-407E-A947-70E740481C1C}">
-                <a14:useLocalDpi xmlns:a14="http://schemas.microsoft.com/office/drawing/2010/main" val="0"/>
-              </a:ext>
-            </a:extLst>
-          </a:blip>
-          <a:stretch>
-            <a:fillRect/>
-          </a:stretch>
-        </p:blipFill>
-        <p:spPr>
-          <a:xfrm>
-            <a:off x="2705274" y="3425506"/>
-            <a:ext cx="2253522" cy="1829859"/>
-          </a:xfrm>
-          <a:prstGeom prst="rect">
-            <a:avLst/>
-          </a:prstGeom>
-        </p:spPr>
-      </p:pic>
-      <p:pic>
-        <p:nvPicPr>
-          <p:cNvPr id="8" name="Grafik 6"/>
-          <p:cNvPicPr>
-            <a:picLocks noChangeAspect="1"/>
-          </p:cNvPicPr>
-          <p:nvPr/>
-        </p:nvPicPr>
-        <p:blipFill>
-          <a:blip r:embed="rId7"/>
-          <a:stretch>
-            <a:fillRect/>
-          </a:stretch>
-        </p:blipFill>
-        <p:spPr>
-          <a:xfrm>
-            <a:off x="6592748" y="5071230"/>
-            <a:ext cx="2205057" cy="1466619"/>
-          </a:xfrm>
-          <a:prstGeom prst="rect">
-            <a:avLst/>
-          </a:prstGeom>
-        </p:spPr>
-      </p:pic>
-      <p:pic>
-        <p:nvPicPr>
-          <p:cNvPr id="9" name="Bild 9"/>
-          <p:cNvPicPr>
-            <a:picLocks noChangeAspect="1"/>
-          </p:cNvPicPr>
-          <p:nvPr/>
-        </p:nvPicPr>
-        <p:blipFill>
-          <a:blip r:embed="rId8" cstate="print">
-            <a:extLst>
-              <a:ext uri="{28A0092B-C50C-407E-A947-70E740481C1C}">
-                <a14:useLocalDpi xmlns:a14="http://schemas.microsoft.com/office/drawing/2010/main" val="0"/>
-              </a:ext>
-            </a:extLst>
-          </a:blip>
-          <a:stretch>
-            <a:fillRect/>
-          </a:stretch>
-        </p:blipFill>
-        <p:spPr>
-          <a:xfrm>
-            <a:off x="6592749" y="2763896"/>
-            <a:ext cx="2205056" cy="2004846"/>
-          </a:xfrm>
-          <a:prstGeom prst="rect">
-            <a:avLst/>
-          </a:prstGeom>
-        </p:spPr>
-      </p:pic>
-      <p:sp>
-        <p:nvSpPr>
-          <p:cNvPr id="10" name="Inhaltsplatzhalter 7"/>
-          <p:cNvSpPr>
-            <a:spLocks noGrp="1"/>
-          </p:cNvSpPr>
-          <p:nvPr>
-            <p:ph idx="1"/>
-          </p:nvPr>
-        </p:nvSpPr>
-        <p:spPr>
-          <a:xfrm>
-            <a:off x="5508104" y="3269158"/>
-            <a:ext cx="549166" cy="497161"/>
-          </a:xfrm>
-        </p:spPr>
-        <p:txBody>
-          <a:bodyPr>
-            <a:normAutofit fontScale="92500" lnSpcReduction="20000"/>
-          </a:bodyPr>
-          <a:lstStyle/>
-          <a:p>
-            <a:pPr marL="0" marR="0" lvl="0" indent="0" defTabSz="914400" eaLnBrk="1" fontAlgn="auto" latinLnBrk="0" hangingPunct="1">
-              <a:lnSpc>
-                <a:spcPct val="100000"/>
-              </a:lnSpc>
-              <a:spcBef>
-                <a:spcPts val="0"/>
-              </a:spcBef>
-              <a:spcAft>
-                <a:spcPts val="0"/>
-              </a:spcAft>
-              <a:buClrTx/>
-              <a:buSzTx/>
-              <a:buFontTx/>
-              <a:buNone/>
-              <a:tabLst/>
-              <a:defRPr/>
-            </a:pPr>
-            <a:r>
-              <a:rPr lang="en-US" dirty="0" smtClean="0"/>
-              <a:t>vs</a:t>
-            </a:r>
-            <a:endParaRPr lang="en-US" dirty="0"/>
-          </a:p>
-        </p:txBody>
-      </p:sp>
-    </p:spTree>
-    <p:extLst>
-      <p:ext uri="{BB962C8B-B14F-4D97-AF65-F5344CB8AC3E}">
-        <p14:creationId xmlns:p14="http://schemas.microsoft.com/office/powerpoint/2010/main" val="706680094"/>
-      </p:ext>
-    </p:extLst>
-  </p:cSld>
-  <p:clrMapOvr>
-    <a:masterClrMapping/>
-  </p:clrMapOvr>
-  <p:timing>
-    <p:tnLst>
-      <p:par>
-        <p:cTn id="1" dur="indefinite" restart="never" nodeType="tmRoot"/>
-      </p:par>
-    </p:tnLst>
-  </p:timing>
-</p:sld>
-</file>
-
-<file path=ppt/slides/slide5.xml><?xml version="1.0" encoding="utf-8"?>
-<p:sld xmlns:a="http://schemas.openxmlformats.org/drawingml/2006/main" xmlns:r="http://schemas.openxmlformats.org/officeDocument/2006/relationships" xmlns:p="http://schemas.openxmlformats.org/presentationml/2006/main">
-  <p:cSld>
-    <p:spTree>
-      <p:nvGrpSpPr>
-        <p:cNvPr id="1" name=""/>
-        <p:cNvGrpSpPr/>
-        <p:nvPr/>
-      </p:nvGrpSpPr>
-      <p:grpSpPr>
-        <a:xfrm>
-          <a:off x="0" y="0"/>
-          <a:ext cx="0" cy="0"/>
-          <a:chOff x="0" y="0"/>
-          <a:chExt cx="0" cy="0"/>
-        </a:xfrm>
-      </p:grpSpPr>
-      <p:sp>
-        <p:nvSpPr>
-          <p:cNvPr id="2" name="Titel 1"/>
-          <p:cNvSpPr>
-            <a:spLocks noGrp="1"/>
-          </p:cNvSpPr>
-          <p:nvPr>
-            <p:ph type="title"/>
-          </p:nvPr>
-        </p:nvSpPr>
-        <p:spPr/>
-        <p:txBody>
-          <a:bodyPr/>
-          <a:lstStyle/>
-          <a:p>
-            <a:pPr algn="l"/>
-            <a:r>
               <a:rPr lang="de-DE" b="1" dirty="0" smtClean="0"/>
               <a:t>Advantages</a:t>
             </a:r>
@@ -5498,7 +5220,7 @@
 </p:sld>
 </file>
 
-<file path=ppt/slides/slide6.xml><?xml version="1.0" encoding="utf-8"?>
+<file path=ppt/slides/slide5.xml><?xml version="1.0" encoding="utf-8"?>
 <p:sld xmlns:a="http://schemas.openxmlformats.org/drawingml/2006/main" xmlns:r="http://schemas.openxmlformats.org/officeDocument/2006/relationships" xmlns:p="http://schemas.openxmlformats.org/presentationml/2006/main">
   <p:cSld>
     <p:spTree>
@@ -5857,7 +5579,7 @@
 </p:sld>
 </file>
 
-<file path=ppt/slides/slide7.xml><?xml version="1.0" encoding="utf-8"?>
+<file path=ppt/slides/slide6.xml><?xml version="1.0" encoding="utf-8"?>
 <p:sld xmlns:a="http://schemas.openxmlformats.org/drawingml/2006/main" xmlns:r="http://schemas.openxmlformats.org/officeDocument/2006/relationships" xmlns:p="http://schemas.openxmlformats.org/presentationml/2006/main">
   <p:cSld>
     <p:spTree>
@@ -6200,6 +5922,267 @@
 </p:sld>
 </file>
 
+<file path=ppt/slides/slide7.xml><?xml version="1.0" encoding="utf-8"?>
+<p:sld xmlns:a="http://schemas.openxmlformats.org/drawingml/2006/main" xmlns:r="http://schemas.openxmlformats.org/officeDocument/2006/relationships" xmlns:p="http://schemas.openxmlformats.org/presentationml/2006/main">
+  <p:cSld>
+    <p:bg>
+      <p:bgPr>
+        <a:solidFill>
+          <a:schemeClr val="tx1"/>
+        </a:solidFill>
+        <a:effectLst/>
+      </p:bgPr>
+    </p:bg>
+    <p:spTree>
+      <p:nvGrpSpPr>
+        <p:cNvPr id="1" name=""/>
+        <p:cNvGrpSpPr/>
+        <p:nvPr/>
+      </p:nvGrpSpPr>
+      <p:grpSpPr>
+        <a:xfrm>
+          <a:off x="0" y="0"/>
+          <a:ext cx="0" cy="0"/>
+          <a:chOff x="0" y="0"/>
+          <a:chExt cx="0" cy="0"/>
+        </a:xfrm>
+      </p:grpSpPr>
+      <p:sp>
+        <p:nvSpPr>
+          <p:cNvPr id="2" name="Titel 1"/>
+          <p:cNvSpPr>
+            <a:spLocks noGrp="1"/>
+          </p:cNvSpPr>
+          <p:nvPr>
+            <p:ph type="title"/>
+          </p:nvPr>
+        </p:nvSpPr>
+        <p:spPr/>
+        <p:txBody>
+          <a:bodyPr/>
+          <a:lstStyle/>
+          <a:p>
+            <a:endParaRPr lang="de-DE" dirty="0"/>
+          </a:p>
+        </p:txBody>
+      </p:sp>
+      <p:pic>
+        <p:nvPicPr>
+          <p:cNvPr id="4" name="tAr7xjKoM5A"/>
+          <p:cNvPicPr>
+            <a:picLocks noGrp="1" noRot="1" noChangeAspect="1"/>
+          </p:cNvPicPr>
+          <p:nvPr>
+            <p:ph idx="1"/>
+            <a:videoFile r:link="rId1"/>
+          </p:nvPr>
+        </p:nvPicPr>
+        <p:blipFill rotWithShape="1">
+          <a:blip r:embed="rId4"/>
+          <a:srcRect/>
+          <a:stretch/>
+        </p:blipFill>
+        <p:spPr>
+          <a:xfrm>
+            <a:off x="-36512" y="836712"/>
+            <a:ext cx="9204511" cy="5177538"/>
+          </a:xfrm>
+          <a:prstGeom prst="rect">
+            <a:avLst/>
+          </a:prstGeom>
+        </p:spPr>
+      </p:pic>
+      <p:sp>
+        <p:nvSpPr>
+          <p:cNvPr id="5" name="Rechteck 4"/>
+          <p:cNvSpPr/>
+          <p:nvPr/>
+        </p:nvSpPr>
+        <p:spPr>
+          <a:xfrm>
+            <a:off x="1697636" y="5343056"/>
+            <a:ext cx="44970" cy="359765"/>
+          </a:xfrm>
+          <a:prstGeom prst="rect">
+            <a:avLst/>
+          </a:prstGeom>
+        </p:spPr>
+        <p:style>
+          <a:lnRef idx="2">
+            <a:schemeClr val="accent2">
+              <a:shade val="50000"/>
+            </a:schemeClr>
+          </a:lnRef>
+          <a:fillRef idx="1">
+            <a:schemeClr val="accent2"/>
+          </a:fillRef>
+          <a:effectRef idx="0">
+            <a:schemeClr val="accent2"/>
+          </a:effectRef>
+          <a:fontRef idx="minor">
+            <a:schemeClr val="lt1"/>
+          </a:fontRef>
+        </p:style>
+        <p:txBody>
+          <a:bodyPr rtlCol="0" anchor="ctr"/>
+          <a:lstStyle/>
+          <a:p>
+            <a:pPr algn="ctr"/>
+            <a:endParaRPr lang="de-DE" sz="1350"/>
+          </a:p>
+        </p:txBody>
+      </p:sp>
+    </p:spTree>
+    <p:extLst>
+      <p:ext uri="{BB962C8B-B14F-4D97-AF65-F5344CB8AC3E}">
+        <p14:creationId xmlns:p14="http://schemas.microsoft.com/office/powerpoint/2010/main" val="4256030266"/>
+      </p:ext>
+    </p:extLst>
+  </p:cSld>
+  <p:clrMapOvr>
+    <a:masterClrMapping/>
+  </p:clrMapOvr>
+  <p:timing>
+    <p:tnLst>
+      <p:par>
+        <p:cTn id="1" dur="indefinite" restart="never" nodeType="tmRoot">
+          <p:childTnLst>
+            <p:seq concurrent="1" nextAc="seek">
+              <p:cTn id="2" dur="indefinite" nodeType="mainSeq">
+                <p:childTnLst>
+                  <p:par>
+                    <p:cTn id="3" fill="hold">
+                      <p:stCondLst>
+                        <p:cond delay="indefinite"/>
+                        <p:cond evt="onBegin" delay="0">
+                          <p:tn val="2"/>
+                        </p:cond>
+                      </p:stCondLst>
+                      <p:childTnLst>
+                        <p:par>
+                          <p:cTn id="4" fill="hold">
+                            <p:stCondLst>
+                              <p:cond delay="0"/>
+                            </p:stCondLst>
+                            <p:childTnLst>
+                              <p:par>
+                                <p:cTn id="5" presetID="1" presetClass="mediacall" presetSubtype="0" fill="hold" nodeType="afterEffect">
+                                  <p:stCondLst>
+                                    <p:cond delay="0"/>
+                                  </p:stCondLst>
+                                  <p:childTnLst>
+                                    <p:cmd type="call" cmd="playFrom(0.0)">
+                                      <p:cBhvr>
+                                        <p:cTn id="6" dur="1" fill="hold"/>
+                                        <p:tgtEl>
+                                          <p:spTgt spid="4"/>
+                                        </p:tgtEl>
+                                      </p:cBhvr>
+                                    </p:cmd>
+                                  </p:childTnLst>
+                                </p:cTn>
+                              </p:par>
+                            </p:childTnLst>
+                          </p:cTn>
+                        </p:par>
+                      </p:childTnLst>
+                    </p:cTn>
+                  </p:par>
+                </p:childTnLst>
+              </p:cTn>
+              <p:prevCondLst>
+                <p:cond evt="onPrev" delay="0">
+                  <p:tgtEl>
+                    <p:sldTgt/>
+                  </p:tgtEl>
+                </p:cond>
+              </p:prevCondLst>
+              <p:nextCondLst>
+                <p:cond evt="onNext" delay="0">
+                  <p:tgtEl>
+                    <p:sldTgt/>
+                  </p:tgtEl>
+                </p:cond>
+              </p:nextCondLst>
+            </p:seq>
+            <p:video>
+              <p:cMediaNode>
+                <p:cTn id="7" fill="hold" display="0">
+                  <p:stCondLst>
+                    <p:cond delay="indefinite"/>
+                  </p:stCondLst>
+                </p:cTn>
+                <p:tgtEl>
+                  <p:spTgt spid="4"/>
+                </p:tgtEl>
+              </p:cMediaNode>
+            </p:video>
+            <p:seq concurrent="1" nextAc="seek">
+              <p:cTn id="8" restart="whenNotActive" fill="hold" evtFilter="cancelBubble" nodeType="interactiveSeq">
+                <p:stCondLst>
+                  <p:cond evt="onClick" delay="0">
+                    <p:tgtEl>
+                      <p:spTgt spid="4"/>
+                    </p:tgtEl>
+                  </p:cond>
+                </p:stCondLst>
+                <p:endSync evt="end" delay="0">
+                  <p:rtn val="all"/>
+                </p:endSync>
+                <p:childTnLst>
+                  <p:par>
+                    <p:cTn id="9" fill="hold">
+                      <p:stCondLst>
+                        <p:cond delay="0"/>
+                      </p:stCondLst>
+                      <p:childTnLst>
+                        <p:par>
+                          <p:cTn id="10" fill="hold">
+                            <p:stCondLst>
+                              <p:cond delay="0"/>
+                            </p:stCondLst>
+                            <p:childTnLst>
+                              <p:par>
+                                <p:cTn id="11" presetID="2" presetClass="mediacall" presetSubtype="0" fill="hold" nodeType="clickEffect">
+                                  <p:stCondLst>
+                                    <p:cond delay="0"/>
+                                  </p:stCondLst>
+                                  <p:childTnLst>
+                                    <p:cmd type="call" cmd="togglePause">
+                                      <p:cBhvr>
+                                        <p:cTn id="12" dur="1" fill="hold"/>
+                                        <p:tgtEl>
+                                          <p:spTgt spid="4"/>
+                                        </p:tgtEl>
+                                      </p:cBhvr>
+                                    </p:cmd>
+                                  </p:childTnLst>
+                                </p:cTn>
+                              </p:par>
+                            </p:childTnLst>
+                          </p:cTn>
+                        </p:par>
+                      </p:childTnLst>
+                    </p:cTn>
+                  </p:par>
+                </p:childTnLst>
+              </p:cTn>
+              <p:nextCondLst>
+                <p:cond evt="onClick" delay="0">
+                  <p:tgtEl>
+                    <p:spTgt spid="4"/>
+                  </p:tgtEl>
+                </p:cond>
+              </p:nextCondLst>
+            </p:seq>
+          </p:childTnLst>
+        </p:cTn>
+      </p:par>
+    </p:tnLst>
+  </p:timing>
+</p:sld>
+</file>
+
 <file path=ppt/slides/slide8.xml><?xml version="1.0" encoding="utf-8"?>
 <p:sld xmlns:a="http://schemas.openxmlformats.org/drawingml/2006/main" xmlns:r="http://schemas.openxmlformats.org/officeDocument/2006/relationships" xmlns:p="http://schemas.openxmlformats.org/presentationml/2006/main">
   <p:cSld>
@@ -6217,36 +6200,617 @@
           <a:chExt cx="0" cy="0"/>
         </a:xfrm>
       </p:grpSpPr>
+      <p:sp>
+        <p:nvSpPr>
+          <p:cNvPr id="2" name="Titel 1"/>
+          <p:cNvSpPr>
+            <a:spLocks noGrp="1"/>
+          </p:cNvSpPr>
+          <p:nvPr>
+            <p:ph type="title"/>
+          </p:nvPr>
+        </p:nvSpPr>
+        <p:spPr/>
+        <p:txBody>
+          <a:bodyPr/>
+          <a:lstStyle/>
+          <a:p>
+            <a:pPr algn="l"/>
+            <a:r>
+              <a:rPr lang="de-DE" b="1" dirty="0" err="1" smtClean="0"/>
+              <a:t>History</a:t>
+            </a:r>
+            <a:endParaRPr lang="de-DE" b="1" dirty="0"/>
+          </a:p>
+        </p:txBody>
+      </p:sp>
       <p:pic>
         <p:nvPicPr>
-          <p:cNvPr id="2" name="EiVY-htgRUY"/>
+          <p:cNvPr id="4" name="Bild 3"/>
           <p:cNvPicPr>
-            <a:picLocks noRot="1" noChangeAspect="1"/>
+            <a:picLocks noChangeAspect="1"/>
           </p:cNvPicPr>
-          <p:nvPr>
-            <a:videoFile r:link="rId1"/>
-          </p:nvPr>
+          <p:nvPr/>
         </p:nvPicPr>
         <p:blipFill>
-          <a:blip r:embed="rId4"/>
+          <a:blip r:embed="rId3">
+            <a:extLst>
+              <a:ext uri="{28A0092B-C50C-407E-A947-70E740481C1C}">
+                <a14:useLocalDpi xmlns:a14="http://schemas.microsoft.com/office/drawing/2010/main" val="0"/>
+              </a:ext>
+            </a:extLst>
+          </a:blip>
           <a:stretch>
             <a:fillRect/>
           </a:stretch>
         </p:blipFill>
         <p:spPr>
           <a:xfrm>
-            <a:off x="-30439" y="404664"/>
-            <a:ext cx="9144000" cy="6858000"/>
+            <a:off x="384168" y="1412776"/>
+            <a:ext cx="1778876" cy="1778876"/>
           </a:xfrm>
           <a:prstGeom prst="rect">
             <a:avLst/>
           </a:prstGeom>
         </p:spPr>
       </p:pic>
+      <p:pic>
+        <p:nvPicPr>
+          <p:cNvPr id="5" name="Bild 4"/>
+          <p:cNvPicPr>
+            <a:picLocks noChangeAspect="1"/>
+          </p:cNvPicPr>
+          <p:nvPr/>
+        </p:nvPicPr>
+        <p:blipFill>
+          <a:blip r:embed="rId4" cstate="print">
+            <a:extLst>
+              <a:ext uri="{28A0092B-C50C-407E-A947-70E740481C1C}">
+                <a14:useLocalDpi xmlns:a14="http://schemas.microsoft.com/office/drawing/2010/main" val="0"/>
+              </a:ext>
+            </a:extLst>
+          </a:blip>
+          <a:stretch>
+            <a:fillRect/>
+          </a:stretch>
+        </p:blipFill>
+        <p:spPr>
+          <a:xfrm>
+            <a:off x="2163044" y="1412776"/>
+            <a:ext cx="3345060" cy="1778876"/>
+          </a:xfrm>
+          <a:prstGeom prst="rect">
+            <a:avLst/>
+          </a:prstGeom>
+        </p:spPr>
+      </p:pic>
+      <p:pic>
+        <p:nvPicPr>
+          <p:cNvPr id="6" name="Bild 5"/>
+          <p:cNvPicPr>
+            <a:picLocks noChangeAspect="1"/>
+          </p:cNvPicPr>
+          <p:nvPr/>
+        </p:nvPicPr>
+        <p:blipFill>
+          <a:blip r:embed="rId5" cstate="print">
+            <a:extLst>
+              <a:ext uri="{28A0092B-C50C-407E-A947-70E740481C1C}">
+                <a14:useLocalDpi xmlns:a14="http://schemas.microsoft.com/office/drawing/2010/main" val="0"/>
+              </a:ext>
+            </a:extLst>
+          </a:blip>
+          <a:stretch>
+            <a:fillRect/>
+          </a:stretch>
+        </p:blipFill>
+        <p:spPr>
+          <a:xfrm>
+            <a:off x="191040" y="3425506"/>
+            <a:ext cx="2165131" cy="2165131"/>
+          </a:xfrm>
+          <a:prstGeom prst="rect">
+            <a:avLst/>
+          </a:prstGeom>
+        </p:spPr>
+      </p:pic>
+      <p:pic>
+        <p:nvPicPr>
+          <p:cNvPr id="7" name="Bild 6"/>
+          <p:cNvPicPr>
+            <a:picLocks noChangeAspect="1"/>
+          </p:cNvPicPr>
+          <p:nvPr/>
+        </p:nvPicPr>
+        <p:blipFill>
+          <a:blip r:embed="rId6">
+            <a:extLst>
+              <a:ext uri="{28A0092B-C50C-407E-A947-70E740481C1C}">
+                <a14:useLocalDpi xmlns:a14="http://schemas.microsoft.com/office/drawing/2010/main" val="0"/>
+              </a:ext>
+            </a:extLst>
+          </a:blip>
+          <a:stretch>
+            <a:fillRect/>
+          </a:stretch>
+        </p:blipFill>
+        <p:spPr>
+          <a:xfrm>
+            <a:off x="2705274" y="3425506"/>
+            <a:ext cx="2253522" cy="1829859"/>
+          </a:xfrm>
+          <a:prstGeom prst="rect">
+            <a:avLst/>
+          </a:prstGeom>
+        </p:spPr>
+      </p:pic>
+      <p:pic>
+        <p:nvPicPr>
+          <p:cNvPr id="8" name="Grafik 6"/>
+          <p:cNvPicPr>
+            <a:picLocks noChangeAspect="1"/>
+          </p:cNvPicPr>
+          <p:nvPr/>
+        </p:nvPicPr>
+        <p:blipFill>
+          <a:blip r:embed="rId7"/>
+          <a:stretch>
+            <a:fillRect/>
+          </a:stretch>
+        </p:blipFill>
+        <p:spPr>
+          <a:xfrm>
+            <a:off x="6592748" y="5071230"/>
+            <a:ext cx="2205057" cy="1466619"/>
+          </a:xfrm>
+          <a:prstGeom prst="rect">
+            <a:avLst/>
+          </a:prstGeom>
+        </p:spPr>
+      </p:pic>
+      <p:pic>
+        <p:nvPicPr>
+          <p:cNvPr id="9" name="Bild 9"/>
+          <p:cNvPicPr>
+            <a:picLocks noChangeAspect="1"/>
+          </p:cNvPicPr>
+          <p:nvPr/>
+        </p:nvPicPr>
+        <p:blipFill>
+          <a:blip r:embed="rId8" cstate="print">
+            <a:extLst>
+              <a:ext uri="{28A0092B-C50C-407E-A947-70E740481C1C}">
+                <a14:useLocalDpi xmlns:a14="http://schemas.microsoft.com/office/drawing/2010/main" val="0"/>
+              </a:ext>
+            </a:extLst>
+          </a:blip>
+          <a:stretch>
+            <a:fillRect/>
+          </a:stretch>
+        </p:blipFill>
+        <p:spPr>
+          <a:xfrm>
+            <a:off x="6592749" y="2763896"/>
+            <a:ext cx="2205056" cy="2004846"/>
+          </a:xfrm>
+          <a:prstGeom prst="rect">
+            <a:avLst/>
+          </a:prstGeom>
+        </p:spPr>
+      </p:pic>
+      <p:sp>
+        <p:nvSpPr>
+          <p:cNvPr id="10" name="Inhaltsplatzhalter 7"/>
+          <p:cNvSpPr>
+            <a:spLocks noGrp="1"/>
+          </p:cNvSpPr>
+          <p:nvPr>
+            <p:ph idx="1"/>
+          </p:nvPr>
+        </p:nvSpPr>
+        <p:spPr>
+          <a:xfrm>
+            <a:off x="5508104" y="3269158"/>
+            <a:ext cx="549166" cy="497161"/>
+          </a:xfrm>
+        </p:spPr>
+        <p:txBody>
+          <a:bodyPr>
+            <a:normAutofit fontScale="92500" lnSpcReduction="20000"/>
+          </a:bodyPr>
+          <a:lstStyle/>
+          <a:p>
+            <a:pPr marL="0" marR="0" lvl="0" indent="0" defTabSz="914400" eaLnBrk="1" fontAlgn="auto" latinLnBrk="0" hangingPunct="1">
+              <a:lnSpc>
+                <a:spcPct val="100000"/>
+              </a:lnSpc>
+              <a:spcBef>
+                <a:spcPts val="0"/>
+              </a:spcBef>
+              <a:spcAft>
+                <a:spcPts val="0"/>
+              </a:spcAft>
+              <a:buClrTx/>
+              <a:buSzTx/>
+              <a:buFontTx/>
+              <a:buNone/>
+              <a:tabLst/>
+              <a:defRPr/>
+            </a:pPr>
+            <a:r>
+              <a:rPr lang="en-US" dirty="0" smtClean="0"/>
+              <a:t>vs</a:t>
+            </a:r>
+            <a:endParaRPr lang="en-US" dirty="0"/>
+          </a:p>
+        </p:txBody>
+      </p:sp>
     </p:spTree>
     <p:extLst>
       <p:ext uri="{BB962C8B-B14F-4D97-AF65-F5344CB8AC3E}">
-        <p14:creationId xmlns:p14="http://schemas.microsoft.com/office/powerpoint/2010/main" val="2882150785"/>
+        <p14:creationId xmlns:p14="http://schemas.microsoft.com/office/powerpoint/2010/main" val="3690253643"/>
+      </p:ext>
+    </p:extLst>
+  </p:cSld>
+  <p:clrMapOvr>
+    <a:masterClrMapping/>
+  </p:clrMapOvr>
+  <p:timing>
+    <p:tnLst>
+      <p:par>
+        <p:cTn id="1" dur="indefinite" restart="never" nodeType="tmRoot"/>
+      </p:par>
+    </p:tnLst>
+  </p:timing>
+</p:sld>
+</file>
+
+<file path=ppt/slides/slide9.xml><?xml version="1.0" encoding="utf-8"?>
+<p:sld xmlns:a="http://schemas.openxmlformats.org/drawingml/2006/main" xmlns:r="http://schemas.openxmlformats.org/officeDocument/2006/relationships" xmlns:p="http://schemas.openxmlformats.org/presentationml/2006/main">
+  <p:cSld>
+    <p:spTree>
+      <p:nvGrpSpPr>
+        <p:cNvPr id="1" name=""/>
+        <p:cNvGrpSpPr/>
+        <p:nvPr/>
+      </p:nvGrpSpPr>
+      <p:grpSpPr>
+        <a:xfrm>
+          <a:off x="0" y="0"/>
+          <a:ext cx="0" cy="0"/>
+          <a:chOff x="0" y="0"/>
+          <a:chExt cx="0" cy="0"/>
+        </a:xfrm>
+      </p:grpSpPr>
+      <p:grpSp>
+        <p:nvGrpSpPr>
+          <p:cNvPr id="2" name="Gruppieren 1"/>
+          <p:cNvGrpSpPr/>
+          <p:nvPr/>
+        </p:nvGrpSpPr>
+        <p:grpSpPr>
+          <a:xfrm>
+            <a:off x="1187624" y="803607"/>
+            <a:ext cx="6840760" cy="2985433"/>
+            <a:chOff x="2901210" y="1169233"/>
+            <a:chExt cx="6840760" cy="2985433"/>
+          </a:xfrm>
+        </p:grpSpPr>
+        <p:sp>
+          <p:nvSpPr>
+            <p:cNvPr id="3" name="Rechteck 2"/>
+            <p:cNvSpPr/>
+            <p:nvPr/>
+          </p:nvSpPr>
+          <p:spPr>
+            <a:xfrm>
+              <a:off x="5998490" y="2201956"/>
+              <a:ext cx="3635115" cy="1952710"/>
+            </a:xfrm>
+            <a:prstGeom prst="rect">
+              <a:avLst/>
+            </a:prstGeom>
+            <a:solidFill>
+              <a:srgbClr val="C00000"/>
+            </a:solidFill>
+            <a:ln w="12700">
+              <a:solidFill>
+                <a:srgbClr val="41719C"/>
+              </a:solidFill>
+            </a:ln>
+          </p:spPr>
+          <p:style>
+            <a:lnRef idx="2">
+              <a:schemeClr val="accent1">
+                <a:shade val="50000"/>
+              </a:schemeClr>
+            </a:lnRef>
+            <a:fillRef idx="1">
+              <a:schemeClr val="accent1"/>
+            </a:fillRef>
+            <a:effectRef idx="0">
+              <a:schemeClr val="accent1"/>
+            </a:effectRef>
+            <a:fontRef idx="minor">
+              <a:schemeClr val="lt1"/>
+            </a:fontRef>
+          </p:style>
+          <p:txBody>
+            <a:bodyPr rtlCol="0" anchor="ctr"/>
+            <a:lstStyle/>
+            <a:p>
+              <a:pPr algn="ctr"/>
+              <a:endParaRPr lang="de-DE"/>
+            </a:p>
+          </p:txBody>
+        </p:sp>
+        <p:sp>
+          <p:nvSpPr>
+            <p:cNvPr id="4" name="Textfeld 3"/>
+            <p:cNvSpPr txBox="1"/>
+            <p:nvPr/>
+          </p:nvSpPr>
+          <p:spPr>
+            <a:xfrm>
+              <a:off x="5990996" y="1169233"/>
+              <a:ext cx="3612629" cy="923330"/>
+            </a:xfrm>
+            <a:prstGeom prst="rect">
+              <a:avLst/>
+            </a:prstGeom>
+            <a:solidFill>
+              <a:schemeClr val="bg1"/>
+            </a:solidFill>
+            <a:ln>
+              <a:solidFill>
+                <a:schemeClr val="accent2">
+                  <a:lumMod val="75000"/>
+                </a:schemeClr>
+              </a:solidFill>
+            </a:ln>
+          </p:spPr>
+          <p:txBody>
+            <a:bodyPr wrap="square" rtlCol="0">
+              <a:spAutoFit/>
+            </a:bodyPr>
+            <a:lstStyle/>
+            <a:p>
+              <a:pPr algn="ctr"/>
+              <a:r>
+                <a:rPr lang="de-DE" sz="5400" dirty="0" err="1" smtClean="0">
+                  <a:latin typeface="Cordia New" panose="020B0304020202020204" pitchFamily="34" charset="-34"/>
+                  <a:cs typeface="Cordia New" panose="020B0304020202020204" pitchFamily="34" charset="-34"/>
+                </a:rPr>
+                <a:t>TechWatch</a:t>
+              </a:r>
+              <a:endParaRPr lang="de-DE" dirty="0">
+                <a:latin typeface="Cordia New" panose="020B0304020202020204" pitchFamily="34" charset="-34"/>
+                <a:cs typeface="Cordia New" panose="020B0304020202020204" pitchFamily="34" charset="-34"/>
+              </a:endParaRPr>
+            </a:p>
+          </p:txBody>
+        </p:sp>
+        <p:sp>
+          <p:nvSpPr>
+            <p:cNvPr id="5" name="Textfeld 4"/>
+            <p:cNvSpPr txBox="1"/>
+            <p:nvPr/>
+          </p:nvSpPr>
+          <p:spPr>
+            <a:xfrm>
+              <a:off x="5882002" y="2242463"/>
+              <a:ext cx="3859968" cy="1384995"/>
+            </a:xfrm>
+            <a:prstGeom prst="rect">
+              <a:avLst/>
+            </a:prstGeom>
+            <a:noFill/>
+          </p:spPr>
+          <p:txBody>
+            <a:bodyPr wrap="square" rtlCol="0">
+              <a:spAutoFit/>
+            </a:bodyPr>
+            <a:lstStyle/>
+            <a:p>
+              <a:pPr algn="ctr"/>
+              <a:r>
+                <a:rPr lang="de-DE" sz="2800" b="1" dirty="0" smtClean="0"/>
+                <a:t># G2</a:t>
+              </a:r>
+              <a:r>
+                <a:rPr lang="de-DE" sz="2800" dirty="0" smtClean="0"/>
+                <a:t/>
+              </a:r>
+              <a:br>
+                <a:rPr lang="de-DE" sz="2800" dirty="0" smtClean="0"/>
+              </a:br>
+              <a:r>
+                <a:rPr lang="de-DE" sz="2800" dirty="0" err="1" smtClean="0">
+                  <a:solidFill>
+                    <a:schemeClr val="tx2">
+                      <a:lumMod val="40000"/>
+                      <a:lumOff val="60000"/>
+                    </a:schemeClr>
+                  </a:solidFill>
+                </a:rPr>
+                <a:t>Thomas.E</a:t>
+              </a:r>
+              <a:r>
+                <a:rPr lang="de-DE" sz="2800" dirty="0" smtClean="0">
+                  <a:solidFill>
+                    <a:schemeClr val="tx2">
+                      <a:lumMod val="40000"/>
+                      <a:lumOff val="60000"/>
+                    </a:schemeClr>
+                  </a:solidFill>
+                </a:rPr>
+                <a:t> , Julia, </a:t>
+              </a:r>
+            </a:p>
+            <a:p>
+              <a:pPr algn="ctr"/>
+              <a:r>
+                <a:rPr lang="de-DE" sz="2800" dirty="0" smtClean="0">
+                  <a:solidFill>
+                    <a:schemeClr val="tx2">
+                      <a:lumMod val="40000"/>
+                      <a:lumOff val="60000"/>
+                    </a:schemeClr>
+                  </a:solidFill>
+                </a:rPr>
+                <a:t>Markus, </a:t>
+              </a:r>
+              <a:r>
+                <a:rPr lang="de-DE" sz="2800" dirty="0" err="1" smtClean="0">
+                  <a:solidFill>
+                    <a:schemeClr val="tx2">
+                      <a:lumMod val="40000"/>
+                      <a:lumOff val="60000"/>
+                    </a:schemeClr>
+                  </a:solidFill>
+                </a:rPr>
+                <a:t>Martin.W</a:t>
+              </a:r>
+              <a:endParaRPr lang="de-DE" sz="2800" dirty="0">
+                <a:solidFill>
+                  <a:schemeClr val="tx2">
+                    <a:lumMod val="40000"/>
+                    <a:lumOff val="60000"/>
+                  </a:schemeClr>
+                </a:solidFill>
+              </a:endParaRPr>
+            </a:p>
+          </p:txBody>
+        </p:sp>
+        <p:sp>
+          <p:nvSpPr>
+            <p:cNvPr id="6" name="Textfeld 5"/>
+            <p:cNvSpPr txBox="1"/>
+            <p:nvPr/>
+          </p:nvSpPr>
+          <p:spPr>
+            <a:xfrm>
+              <a:off x="2901210" y="1169233"/>
+              <a:ext cx="2787560" cy="2985433"/>
+            </a:xfrm>
+            <a:prstGeom prst="rect">
+              <a:avLst/>
+            </a:prstGeom>
+            <a:solidFill>
+              <a:srgbClr val="767171">
+                <a:alpha val="94902"/>
+              </a:srgbClr>
+            </a:solidFill>
+          </p:spPr>
+          <p:txBody>
+            <a:bodyPr wrap="square" rtlCol="0">
+              <a:spAutoFit/>
+            </a:bodyPr>
+            <a:lstStyle/>
+            <a:p>
+              <a:pPr algn="ctr"/>
+              <a:r>
+                <a:rPr lang="de-DE" sz="5000" dirty="0" smtClean="0"/>
+                <a:t/>
+              </a:r>
+              <a:br>
+                <a:rPr lang="de-DE" sz="5000" dirty="0" smtClean="0"/>
+              </a:br>
+              <a:r>
+                <a:rPr lang="de-DE" sz="13800" dirty="0" smtClean="0"/>
+                <a:t>HCI</a:t>
+              </a:r>
+              <a:endParaRPr lang="de-DE" dirty="0"/>
+            </a:p>
+          </p:txBody>
+        </p:sp>
+      </p:grpSp>
+      <p:sp>
+        <p:nvSpPr>
+          <p:cNvPr id="7" name="Titel 1"/>
+          <p:cNvSpPr txBox="1">
+            <a:spLocks/>
+          </p:cNvSpPr>
+          <p:nvPr/>
+        </p:nvSpPr>
+        <p:spPr>
+          <a:xfrm>
+            <a:off x="685800" y="4407247"/>
+            <a:ext cx="7772400" cy="1470025"/>
+          </a:xfrm>
+          <a:prstGeom prst="rect">
+            <a:avLst/>
+          </a:prstGeom>
+        </p:spPr>
+        <p:txBody>
+          <a:bodyPr>
+            <a:noAutofit/>
+          </a:bodyPr>
+          <a:lstStyle>
+            <a:lvl1pPr algn="ctr" defTabSz="914400" rtl="0" eaLnBrk="1" latinLnBrk="0" hangingPunct="1">
+              <a:spcBef>
+                <a:spcPct val="0"/>
+              </a:spcBef>
+              <a:buNone/>
+              <a:defRPr sz="4400" kern="1200">
+                <a:solidFill>
+                  <a:schemeClr val="tx1"/>
+                </a:solidFill>
+                <a:latin typeface="+mj-lt"/>
+                <a:ea typeface="+mj-ea"/>
+                <a:cs typeface="+mj-cs"/>
+              </a:defRPr>
+            </a:lvl1pPr>
+          </a:lstStyle>
+          <a:p>
+            <a:r>
+              <a:rPr lang="de-DE" sz="4800" b="1" dirty="0" smtClean="0"/>
+              <a:t>Remote </a:t>
+            </a:r>
+            <a:r>
+              <a:rPr lang="de-DE" sz="4800" b="1" dirty="0" err="1" smtClean="0"/>
+              <a:t>controlled</a:t>
+            </a:r>
+            <a:r>
+              <a:rPr lang="de-DE" sz="4800" b="1" dirty="0" smtClean="0"/>
+              <a:t> </a:t>
+            </a:r>
+            <a:r>
+              <a:rPr lang="de-DE" sz="4800" b="1" dirty="0" err="1" smtClean="0"/>
+              <a:t>robotics</a:t>
+            </a:r>
+            <a:r>
+              <a:rPr lang="de-DE" sz="4800" b="1" dirty="0" smtClean="0"/>
+              <a:t> </a:t>
+            </a:r>
+            <a:r>
+              <a:rPr lang="de-DE" sz="4800" b="1" dirty="0" err="1" smtClean="0"/>
+              <a:t>with</a:t>
+            </a:r>
+            <a:r>
+              <a:rPr lang="de-DE" sz="4800" b="1" dirty="0" smtClean="0"/>
+              <a:t> </a:t>
+            </a:r>
+            <a:r>
+              <a:rPr lang="de-DE" sz="4800" b="1" dirty="0" err="1" smtClean="0"/>
+              <a:t>haptic</a:t>
+            </a:r>
+            <a:r>
+              <a:rPr lang="de-DE" sz="4800" b="1" dirty="0" smtClean="0"/>
+              <a:t> </a:t>
+            </a:r>
+            <a:r>
+              <a:rPr lang="de-DE" sz="4800" b="1" dirty="0" err="1" smtClean="0"/>
+              <a:t>feedback</a:t>
+            </a:r>
+            <a:endParaRPr lang="de-DE" sz="4800" b="1" dirty="0"/>
+          </a:p>
+        </p:txBody>
+      </p:sp>
+    </p:spTree>
+    <p:extLst>
+      <p:ext uri="{BB962C8B-B14F-4D97-AF65-F5344CB8AC3E}">
+        <p14:creationId xmlns:p14="http://schemas.microsoft.com/office/powerpoint/2010/main" val="3458880756"/>
       </p:ext>
     </p:extLst>
   </p:cSld>

</xml_diff>